<commit_message>
updated btm and powerpoint
</commit_message>
<xml_diff>
--- a/cars_case_study.pptx
+++ b/cars_case_study.pptx
@@ -10,6 +10,9 @@
     <p:sldId id="262" r:id="rId4"/>
     <p:sldId id="263" r:id="rId5"/>
     <p:sldId id="258" r:id="rId6"/>
+    <p:sldId id="264" r:id="rId7"/>
+    <p:sldId id="265" r:id="rId8"/>
+    <p:sldId id="266" r:id="rId9"/>
   </p:sldIdLst>
   <p:sldSz cx="12192000" cy="6858000"/>
   <p:notesSz cx="6858000" cy="9144000"/>
@@ -4801,7 +4804,7 @@
           <a:lstStyle/>
           <a:p>
             <a:r>
-              <a:rPr lang="en-US" sz="4800"/>
+              <a:rPr lang="en-US" sz="4800" dirty="0"/>
               <a:t>Cars: 1970-1982</a:t>
             </a:r>
           </a:p>
@@ -6968,6 +6971,1692 @@
     <p:extLst>
       <p:ext uri="{BB962C8B-B14F-4D97-AF65-F5344CB8AC3E}">
         <p14:creationId xmlns:p14="http://schemas.microsoft.com/office/powerpoint/2010/main" val="2515191304"/>
+      </p:ext>
+    </p:extLst>
+  </p:cSld>
+  <p:clrMapOvr>
+    <a:masterClrMapping/>
+  </p:clrMapOvr>
+</p:sld>
+</file>
+
+<file path=ppt/slides/slide6.xml><?xml version="1.0" encoding="utf-8"?>
+<p:sld xmlns:a="http://schemas.openxmlformats.org/drawingml/2006/main" xmlns:r="http://schemas.openxmlformats.org/officeDocument/2006/relationships" xmlns:p="http://schemas.openxmlformats.org/presentationml/2006/main">
+  <p:cSld>
+    <p:bg>
+      <p:bgPr>
+        <a:blipFill rotWithShape="1">
+          <a:blip r:embed="rId2"/>
+          <a:stretch/>
+        </a:blipFill>
+        <a:effectLst/>
+      </p:bgPr>
+    </p:bg>
+    <p:spTree>
+      <p:nvGrpSpPr>
+        <p:cNvPr id="1" name=""/>
+        <p:cNvGrpSpPr/>
+        <p:nvPr/>
+      </p:nvGrpSpPr>
+      <p:grpSpPr>
+        <a:xfrm>
+          <a:off x="0" y="0"/>
+          <a:ext cx="0" cy="0"/>
+          <a:chOff x="0" y="0"/>
+          <a:chExt cx="0" cy="0"/>
+        </a:xfrm>
+      </p:grpSpPr>
+      <p:sp useBgFill="1">
+        <p:nvSpPr>
+          <p:cNvPr id="31" name="Rectangle 30">
+            <a:extLst>
+              <a:ext uri="{FF2B5EF4-FFF2-40B4-BE49-F238E27FC236}">
+                <a16:creationId xmlns:a16="http://schemas.microsoft.com/office/drawing/2014/main" id="{9B0F3308-12C4-4DD7-ABB4-D0DFAA3CF6DE}"/>
+              </a:ext>
+              <a:ext uri="{C183D7F6-B498-43B3-948B-1728B52AA6E4}">
+                <adec:decorative xmlns:adec="http://schemas.microsoft.com/office/drawing/2017/decorative" val="1"/>
+              </a:ext>
+            </a:extLst>
+          </p:cNvPr>
+          <p:cNvSpPr>
+            <a:spLocks noGrp="1" noRot="1" noChangeAspect="1" noMove="1" noResize="1" noEditPoints="1" noAdjustHandles="1" noChangeArrowheads="1" noChangeShapeType="1" noTextEdit="1"/>
+          </p:cNvSpPr>
+          <p:nvPr>
+            <p:extLst>
+              <p:ext uri="{386F3935-93C4-4BCD-93E2-E3B085C9AB24}">
+                <p16:designElem xmlns:p16="http://schemas.microsoft.com/office/powerpoint/2015/main" val="1"/>
+              </p:ext>
+            </p:extLst>
+          </p:nvPr>
+        </p:nvSpPr>
+        <p:spPr>
+          <a:xfrm>
+            <a:off x="0" y="0"/>
+            <a:ext cx="12189867" cy="6855282"/>
+          </a:xfrm>
+          <a:prstGeom prst="rect">
+            <a:avLst/>
+          </a:prstGeom>
+          <a:ln>
+            <a:noFill/>
+          </a:ln>
+        </p:spPr>
+        <p:style>
+          <a:lnRef idx="2">
+            <a:schemeClr val="accent1">
+              <a:shade val="50000"/>
+            </a:schemeClr>
+          </a:lnRef>
+          <a:fillRef idx="1">
+            <a:schemeClr val="accent1"/>
+          </a:fillRef>
+          <a:effectRef idx="0">
+            <a:schemeClr val="accent1"/>
+          </a:effectRef>
+          <a:fontRef idx="minor">
+            <a:schemeClr val="lt1"/>
+          </a:fontRef>
+        </p:style>
+        <p:txBody>
+          <a:bodyPr rtlCol="0" anchor="ctr"/>
+          <a:lstStyle/>
+          <a:p>
+            <a:pPr algn="ctr"/>
+            <a:endParaRPr lang="en-US"/>
+          </a:p>
+        </p:txBody>
+      </p:sp>
+      <p:pic>
+        <p:nvPicPr>
+          <p:cNvPr id="33" name="Picture 32">
+            <a:extLst>
+              <a:ext uri="{FF2B5EF4-FFF2-40B4-BE49-F238E27FC236}">
+                <a16:creationId xmlns:a16="http://schemas.microsoft.com/office/drawing/2014/main" id="{6A24046D-AAB6-4470-AC22-6448D576E5B5}"/>
+              </a:ext>
+              <a:ext uri="{C183D7F6-B498-43B3-948B-1728B52AA6E4}">
+                <adec:decorative xmlns:adec="http://schemas.microsoft.com/office/drawing/2017/decorative" val="1"/>
+              </a:ext>
+            </a:extLst>
+          </p:cNvPr>
+          <p:cNvPicPr>
+            <a:picLocks noGrp="1" noRot="1" noChangeAspect="1" noMove="1" noResize="1" noEditPoints="1" noAdjustHandles="1" noChangeArrowheads="1" noChangeShapeType="1" noCrop="1"/>
+          </p:cNvPicPr>
+          <p:nvPr>
+            <p:extLst>
+              <p:ext uri="{386F3935-93C4-4BCD-93E2-E3B085C9AB24}">
+                <p16:designElem xmlns:p16="http://schemas.microsoft.com/office/powerpoint/2015/main" val="1"/>
+              </p:ext>
+            </p:extLst>
+          </p:nvPr>
+        </p:nvPicPr>
+        <p:blipFill>
+          <a:blip r:embed="rId3">
+            <a:extLst>
+              <a:ext uri="{28A0092B-C50C-407E-A947-70E740481C1C}">
+                <a14:useLocalDpi xmlns:a14="http://schemas.microsoft.com/office/drawing/2010/main" val="0"/>
+              </a:ext>
+            </a:extLst>
+          </a:blip>
+          <a:stretch>
+            <a:fillRect/>
+          </a:stretch>
+        </p:blipFill>
+        <p:spPr>
+          <a:xfrm>
+            <a:off x="2831794" y="2105202"/>
+            <a:ext cx="9360205" cy="4752798"/>
+          </a:xfrm>
+          <a:prstGeom prst="rect">
+            <a:avLst/>
+          </a:prstGeom>
+        </p:spPr>
+      </p:pic>
+      <p:pic>
+        <p:nvPicPr>
+          <p:cNvPr id="35" name="Picture 34">
+            <a:extLst>
+              <a:ext uri="{FF2B5EF4-FFF2-40B4-BE49-F238E27FC236}">
+                <a16:creationId xmlns:a16="http://schemas.microsoft.com/office/drawing/2014/main" id="{211A0A85-392D-49DA-B9EC-82262B3B9614}"/>
+              </a:ext>
+              <a:ext uri="{C183D7F6-B498-43B3-948B-1728B52AA6E4}">
+                <adec:decorative xmlns:adec="http://schemas.microsoft.com/office/drawing/2017/decorative" val="1"/>
+              </a:ext>
+            </a:extLst>
+          </p:cNvPr>
+          <p:cNvPicPr>
+            <a:picLocks noGrp="1" noRot="1" noChangeAspect="1" noMove="1" noResize="1" noEditPoints="1" noAdjustHandles="1" noChangeArrowheads="1" noChangeShapeType="1" noCrop="1"/>
+          </p:cNvPicPr>
+          <p:nvPr>
+            <p:extLst>
+              <p:ext uri="{386F3935-93C4-4BCD-93E2-E3B085C9AB24}">
+                <p16:designElem xmlns:p16="http://schemas.microsoft.com/office/powerpoint/2015/main" val="1"/>
+              </p:ext>
+            </p:extLst>
+          </p:nvPr>
+        </p:nvPicPr>
+        <p:blipFill>
+          <a:blip r:embed="rId4">
+            <a:alphaModFix/>
+            <a:extLst>
+              <a:ext uri="{28A0092B-C50C-407E-A947-70E740481C1C}">
+                <a14:useLocalDpi xmlns:a14="http://schemas.microsoft.com/office/drawing/2010/main" val="0"/>
+              </a:ext>
+            </a:extLst>
+          </a:blip>
+          <a:stretch>
+            <a:fillRect/>
+          </a:stretch>
+        </p:blipFill>
+        <p:spPr>
+          <a:xfrm>
+            <a:off x="0" y="0"/>
+            <a:ext cx="12189867" cy="6858000"/>
+          </a:xfrm>
+          <a:prstGeom prst="rect">
+            <a:avLst/>
+          </a:prstGeom>
+        </p:spPr>
+      </p:pic>
+      <p:sp>
+        <p:nvSpPr>
+          <p:cNvPr id="37" name="Rectangle 36">
+            <a:extLst>
+              <a:ext uri="{FF2B5EF4-FFF2-40B4-BE49-F238E27FC236}">
+                <a16:creationId xmlns:a16="http://schemas.microsoft.com/office/drawing/2014/main" id="{73AFD74C-283C-45BD-885B-6E6635E4B3F1}"/>
+              </a:ext>
+              <a:ext uri="{C183D7F6-B498-43B3-948B-1728B52AA6E4}">
+                <adec:decorative xmlns:adec="http://schemas.microsoft.com/office/drawing/2017/decorative" val="1"/>
+              </a:ext>
+            </a:extLst>
+          </p:cNvPr>
+          <p:cNvSpPr>
+            <a:spLocks noGrp="1" noRot="1" noChangeAspect="1" noMove="1" noResize="1" noEditPoints="1" noAdjustHandles="1" noChangeArrowheads="1" noChangeShapeType="1" noTextEdit="1"/>
+          </p:cNvSpPr>
+          <p:nvPr>
+            <p:extLst>
+              <p:ext uri="{386F3935-93C4-4BCD-93E2-E3B085C9AB24}">
+                <p16:designElem xmlns:p16="http://schemas.microsoft.com/office/powerpoint/2015/main" val="1"/>
+              </p:ext>
+            </p:extLst>
+          </p:nvPr>
+        </p:nvSpPr>
+        <p:spPr>
+          <a:xfrm>
+            <a:off x="0" y="0"/>
+            <a:ext cx="964174" cy="6858000"/>
+          </a:xfrm>
+          <a:prstGeom prst="rect">
+            <a:avLst/>
+          </a:prstGeom>
+          <a:solidFill>
+            <a:schemeClr val="bg2"/>
+          </a:solidFill>
+          <a:ln>
+            <a:noFill/>
+          </a:ln>
+        </p:spPr>
+        <p:style>
+          <a:lnRef idx="2">
+            <a:schemeClr val="accent1">
+              <a:shade val="50000"/>
+            </a:schemeClr>
+          </a:lnRef>
+          <a:fillRef idx="1">
+            <a:schemeClr val="accent1"/>
+          </a:fillRef>
+          <a:effectRef idx="0">
+            <a:schemeClr val="accent1"/>
+          </a:effectRef>
+          <a:fontRef idx="minor">
+            <a:schemeClr val="lt1"/>
+          </a:fontRef>
+        </p:style>
+        <p:txBody>
+          <a:bodyPr rtlCol="0" anchor="ctr"/>
+          <a:lstStyle/>
+          <a:p>
+            <a:pPr algn="ctr"/>
+            <a:endParaRPr lang="en-US"/>
+          </a:p>
+        </p:txBody>
+      </p:sp>
+      <p:sp>
+        <p:nvSpPr>
+          <p:cNvPr id="39" name="Rectangle 38">
+            <a:extLst>
+              <a:ext uri="{FF2B5EF4-FFF2-40B4-BE49-F238E27FC236}">
+                <a16:creationId xmlns:a16="http://schemas.microsoft.com/office/drawing/2014/main" id="{CE3DE725-FEB0-422F-BDBA-A29C95768A3F}"/>
+              </a:ext>
+              <a:ext uri="{C183D7F6-B498-43B3-948B-1728B52AA6E4}">
+                <adec:decorative xmlns:adec="http://schemas.microsoft.com/office/drawing/2017/decorative" val="1"/>
+              </a:ext>
+            </a:extLst>
+          </p:cNvPr>
+          <p:cNvSpPr>
+            <a:spLocks noGrp="1" noRot="1" noChangeAspect="1" noMove="1" noResize="1" noEditPoints="1" noAdjustHandles="1" noChangeArrowheads="1" noChangeShapeType="1" noTextEdit="1"/>
+          </p:cNvSpPr>
+          <p:nvPr>
+            <p:extLst>
+              <p:ext uri="{386F3935-93C4-4BCD-93E2-E3B085C9AB24}">
+                <p16:designElem xmlns:p16="http://schemas.microsoft.com/office/powerpoint/2015/main" val="1"/>
+              </p:ext>
+            </p:extLst>
+          </p:nvPr>
+        </p:nvSpPr>
+        <p:spPr>
+          <a:xfrm>
+            <a:off x="962042" y="0"/>
+            <a:ext cx="45719" cy="6858000"/>
+          </a:xfrm>
+          <a:prstGeom prst="rect">
+            <a:avLst/>
+          </a:prstGeom>
+          <a:solidFill>
+            <a:schemeClr val="accent6"/>
+          </a:solidFill>
+          <a:ln>
+            <a:noFill/>
+          </a:ln>
+        </p:spPr>
+        <p:style>
+          <a:lnRef idx="2">
+            <a:schemeClr val="accent1">
+              <a:shade val="50000"/>
+            </a:schemeClr>
+          </a:lnRef>
+          <a:fillRef idx="1">
+            <a:schemeClr val="accent1"/>
+          </a:fillRef>
+          <a:effectRef idx="0">
+            <a:schemeClr val="accent1"/>
+          </a:effectRef>
+          <a:fontRef idx="minor">
+            <a:schemeClr val="lt1"/>
+          </a:fontRef>
+        </p:style>
+        <p:txBody>
+          <a:bodyPr rtlCol="0" anchor="ctr"/>
+          <a:lstStyle/>
+          <a:p>
+            <a:pPr algn="ctr"/>
+            <a:endParaRPr lang="en-US"/>
+          </a:p>
+        </p:txBody>
+      </p:sp>
+      <p:sp>
+        <p:nvSpPr>
+          <p:cNvPr id="41" name="Rectangle 40">
+            <a:extLst>
+              <a:ext uri="{FF2B5EF4-FFF2-40B4-BE49-F238E27FC236}">
+                <a16:creationId xmlns:a16="http://schemas.microsoft.com/office/drawing/2014/main" id="{05058156-257B-4118-BA50-5869C8AF6AD7}"/>
+              </a:ext>
+              <a:ext uri="{C183D7F6-B498-43B3-948B-1728B52AA6E4}">
+                <adec:decorative xmlns:adec="http://schemas.microsoft.com/office/drawing/2017/decorative" val="1"/>
+              </a:ext>
+            </a:extLst>
+          </p:cNvPr>
+          <p:cNvSpPr>
+            <a:spLocks noGrp="1" noRot="1" noChangeAspect="1" noMove="1" noResize="1" noEditPoints="1" noAdjustHandles="1" noChangeArrowheads="1" noChangeShapeType="1" noTextEdit="1"/>
+          </p:cNvSpPr>
+          <p:nvPr>
+            <p:extLst>
+              <p:ext uri="{386F3935-93C4-4BCD-93E2-E3B085C9AB24}">
+                <p16:designElem xmlns:p16="http://schemas.microsoft.com/office/powerpoint/2015/main" val="1"/>
+              </p:ext>
+            </p:extLst>
+          </p:nvPr>
+        </p:nvSpPr>
+        <p:spPr>
+          <a:xfrm>
+            <a:off x="1007533" y="0"/>
+            <a:ext cx="10378001" cy="6858000"/>
+          </a:xfrm>
+          <a:prstGeom prst="rect">
+            <a:avLst/>
+          </a:prstGeom>
+          <a:solidFill>
+            <a:schemeClr val="bg2">
+              <a:alpha val="92000"/>
+            </a:schemeClr>
+          </a:solidFill>
+          <a:ln>
+            <a:noFill/>
+          </a:ln>
+        </p:spPr>
+        <p:style>
+          <a:lnRef idx="2">
+            <a:schemeClr val="accent1">
+              <a:shade val="50000"/>
+            </a:schemeClr>
+          </a:lnRef>
+          <a:fillRef idx="1">
+            <a:schemeClr val="accent1"/>
+          </a:fillRef>
+          <a:effectRef idx="0">
+            <a:schemeClr val="accent1"/>
+          </a:effectRef>
+          <a:fontRef idx="minor">
+            <a:schemeClr val="lt1"/>
+          </a:fontRef>
+        </p:style>
+        <p:txBody>
+          <a:bodyPr rtlCol="0" anchor="ctr"/>
+          <a:lstStyle/>
+          <a:p>
+            <a:pPr algn="ctr"/>
+            <a:endParaRPr lang="en-US"/>
+          </a:p>
+        </p:txBody>
+      </p:sp>
+      <p:pic>
+        <p:nvPicPr>
+          <p:cNvPr id="7" name="Content Placeholder 6">
+            <a:extLst>
+              <a:ext uri="{FF2B5EF4-FFF2-40B4-BE49-F238E27FC236}">
+                <a16:creationId xmlns:a16="http://schemas.microsoft.com/office/drawing/2014/main" id="{DDB867B2-5033-CAA1-4EFB-489AD91F2D11}"/>
+              </a:ext>
+            </a:extLst>
+          </p:cNvPr>
+          <p:cNvPicPr>
+            <a:picLocks noChangeAspect="1"/>
+          </p:cNvPicPr>
+          <p:nvPr/>
+        </p:nvPicPr>
+        <p:blipFill>
+          <a:blip r:embed="rId5"/>
+          <a:srcRect/>
+          <a:stretch/>
+        </p:blipFill>
+        <p:spPr>
+          <a:xfrm>
+            <a:off x="1968263" y="1263090"/>
+            <a:ext cx="8253337" cy="5051834"/>
+          </a:xfrm>
+          <a:prstGeom prst="rect">
+            <a:avLst/>
+          </a:prstGeom>
+          <a:ln>
+            <a:gradFill flip="none" rotWithShape="1">
+              <a:gsLst>
+                <a:gs pos="86000">
+                  <a:schemeClr val="accent6">
+                    <a:lumMod val="67000"/>
+                  </a:schemeClr>
+                </a:gs>
+                <a:gs pos="20000">
+                  <a:schemeClr val="accent6">
+                    <a:lumMod val="97000"/>
+                    <a:lumOff val="3000"/>
+                  </a:schemeClr>
+                </a:gs>
+                <a:gs pos="100000">
+                  <a:schemeClr val="accent6">
+                    <a:lumMod val="60000"/>
+                    <a:lumOff val="40000"/>
+                  </a:schemeClr>
+                </a:gs>
+              </a:gsLst>
+              <a:lin ang="16200000" scaled="1"/>
+              <a:tileRect/>
+            </a:gradFill>
+          </a:ln>
+          <a:effectLst>
+            <a:innerShdw blurRad="127000">
+              <a:prstClr val="black">
+                <a:alpha val="90000"/>
+              </a:prstClr>
+            </a:innerShdw>
+          </a:effectLst>
+        </p:spPr>
+      </p:pic>
+      <p:sp>
+        <p:nvSpPr>
+          <p:cNvPr id="43" name="Rectangle 42">
+            <a:extLst>
+              <a:ext uri="{FF2B5EF4-FFF2-40B4-BE49-F238E27FC236}">
+                <a16:creationId xmlns:a16="http://schemas.microsoft.com/office/drawing/2014/main" id="{D23B4D99-FEA8-489A-8436-A2F113BE1B6E}"/>
+              </a:ext>
+              <a:ext uri="{C183D7F6-B498-43B3-948B-1728B52AA6E4}">
+                <adec:decorative xmlns:adec="http://schemas.microsoft.com/office/drawing/2017/decorative" val="1"/>
+              </a:ext>
+            </a:extLst>
+          </p:cNvPr>
+          <p:cNvSpPr>
+            <a:spLocks noGrp="1" noRot="1" noChangeAspect="1" noMove="1" noResize="1" noEditPoints="1" noAdjustHandles="1" noChangeArrowheads="1" noChangeShapeType="1" noTextEdit="1"/>
+          </p:cNvSpPr>
+          <p:nvPr>
+            <p:extLst>
+              <p:ext uri="{386F3935-93C4-4BCD-93E2-E3B085C9AB24}">
+                <p16:designElem xmlns:p16="http://schemas.microsoft.com/office/powerpoint/2015/main" val="1"/>
+              </p:ext>
+            </p:extLst>
+          </p:nvPr>
+        </p:nvSpPr>
+        <p:spPr>
+          <a:xfrm>
+            <a:off x="11387666" y="-2718"/>
+            <a:ext cx="27432" cy="6858000"/>
+          </a:xfrm>
+          <a:prstGeom prst="rect">
+            <a:avLst/>
+          </a:prstGeom>
+          <a:solidFill>
+            <a:schemeClr val="accent6"/>
+          </a:solidFill>
+          <a:ln>
+            <a:noFill/>
+          </a:ln>
+        </p:spPr>
+        <p:style>
+          <a:lnRef idx="2">
+            <a:schemeClr val="accent1">
+              <a:shade val="50000"/>
+            </a:schemeClr>
+          </a:lnRef>
+          <a:fillRef idx="1">
+            <a:schemeClr val="accent1"/>
+          </a:fillRef>
+          <a:effectRef idx="0">
+            <a:schemeClr val="accent1"/>
+          </a:effectRef>
+          <a:fontRef idx="minor">
+            <a:schemeClr val="lt1"/>
+          </a:fontRef>
+        </p:style>
+        <p:txBody>
+          <a:bodyPr rtlCol="0" anchor="ctr"/>
+          <a:lstStyle/>
+          <a:p>
+            <a:pPr algn="ctr"/>
+            <a:endParaRPr lang="en-US"/>
+          </a:p>
+        </p:txBody>
+      </p:sp>
+      <p:sp>
+        <p:nvSpPr>
+          <p:cNvPr id="8" name="Title 1">
+            <a:extLst>
+              <a:ext uri="{FF2B5EF4-FFF2-40B4-BE49-F238E27FC236}">
+                <a16:creationId xmlns:a16="http://schemas.microsoft.com/office/drawing/2014/main" id="{780578A0-2D91-03E7-331D-C72C38A11101}"/>
+              </a:ext>
+            </a:extLst>
+          </p:cNvPr>
+          <p:cNvSpPr txBox="1">
+            <a:spLocks/>
+          </p:cNvSpPr>
+          <p:nvPr/>
+        </p:nvSpPr>
+        <p:spPr>
+          <a:xfrm>
+            <a:off x="2115767" y="185861"/>
+            <a:ext cx="7958331" cy="1077229"/>
+          </a:xfrm>
+          <a:prstGeom prst="rect">
+            <a:avLst/>
+          </a:prstGeom>
+        </p:spPr>
+        <p:txBody>
+          <a:bodyPr vert="horz" lIns="91440" tIns="45720" rIns="91440" bIns="45720" rtlCol="0" anchor="t">
+            <a:normAutofit/>
+          </a:bodyPr>
+          <a:lstStyle>
+            <a:lvl1pPr algn="r" defTabSz="914400" rtl="0" eaLnBrk="1" latinLnBrk="0" hangingPunct="1">
+              <a:lnSpc>
+                <a:spcPct val="90000"/>
+              </a:lnSpc>
+              <a:spcBef>
+                <a:spcPct val="0"/>
+              </a:spcBef>
+              <a:buNone/>
+              <a:defRPr sz="3400" b="0" i="0" kern="1200" cap="none">
+                <a:solidFill>
+                  <a:schemeClr val="tx1"/>
+                </a:solidFill>
+                <a:effectLst/>
+                <a:latin typeface="+mj-lt"/>
+                <a:ea typeface="+mj-ea"/>
+                <a:cs typeface="+mj-cs"/>
+              </a:defRPr>
+            </a:lvl1pPr>
+          </a:lstStyle>
+          <a:p>
+            <a:pPr algn="l"/>
+            <a:r>
+              <a:rPr lang="en-US" sz="3600" dirty="0"/>
+              <a:t>Initial Sample Distribution</a:t>
+            </a:r>
+            <a:endParaRPr lang="en-US" sz="2000" dirty="0"/>
+          </a:p>
+        </p:txBody>
+      </p:sp>
+    </p:spTree>
+    <p:extLst>
+      <p:ext uri="{BB962C8B-B14F-4D97-AF65-F5344CB8AC3E}">
+        <p14:creationId xmlns:p14="http://schemas.microsoft.com/office/powerpoint/2010/main" val="1682634334"/>
+      </p:ext>
+    </p:extLst>
+  </p:cSld>
+  <p:clrMapOvr>
+    <a:masterClrMapping/>
+  </p:clrMapOvr>
+</p:sld>
+</file>
+
+<file path=ppt/slides/slide7.xml><?xml version="1.0" encoding="utf-8"?>
+<p:sld xmlns:a="http://schemas.openxmlformats.org/drawingml/2006/main" xmlns:r="http://schemas.openxmlformats.org/officeDocument/2006/relationships" xmlns:p="http://schemas.openxmlformats.org/presentationml/2006/main">
+  <p:cSld>
+    <p:bg>
+      <p:bgPr>
+        <a:blipFill rotWithShape="1">
+          <a:blip r:embed="rId2"/>
+          <a:stretch/>
+        </a:blipFill>
+        <a:effectLst/>
+      </p:bgPr>
+    </p:bg>
+    <p:spTree>
+      <p:nvGrpSpPr>
+        <p:cNvPr id="1" name=""/>
+        <p:cNvGrpSpPr/>
+        <p:nvPr/>
+      </p:nvGrpSpPr>
+      <p:grpSpPr>
+        <a:xfrm>
+          <a:off x="0" y="0"/>
+          <a:ext cx="0" cy="0"/>
+          <a:chOff x="0" y="0"/>
+          <a:chExt cx="0" cy="0"/>
+        </a:xfrm>
+      </p:grpSpPr>
+      <p:sp useBgFill="1">
+        <p:nvSpPr>
+          <p:cNvPr id="31" name="Rectangle 30">
+            <a:extLst>
+              <a:ext uri="{FF2B5EF4-FFF2-40B4-BE49-F238E27FC236}">
+                <a16:creationId xmlns:a16="http://schemas.microsoft.com/office/drawing/2014/main" id="{9B0F3308-12C4-4DD7-ABB4-D0DFAA3CF6DE}"/>
+              </a:ext>
+              <a:ext uri="{C183D7F6-B498-43B3-948B-1728B52AA6E4}">
+                <adec:decorative xmlns:adec="http://schemas.microsoft.com/office/drawing/2017/decorative" val="1"/>
+              </a:ext>
+            </a:extLst>
+          </p:cNvPr>
+          <p:cNvSpPr>
+            <a:spLocks noGrp="1" noRot="1" noChangeAspect="1" noMove="1" noResize="1" noEditPoints="1" noAdjustHandles="1" noChangeArrowheads="1" noChangeShapeType="1" noTextEdit="1"/>
+          </p:cNvSpPr>
+          <p:nvPr>
+            <p:extLst>
+              <p:ext uri="{386F3935-93C4-4BCD-93E2-E3B085C9AB24}">
+                <p16:designElem xmlns:p16="http://schemas.microsoft.com/office/powerpoint/2015/main" val="1"/>
+              </p:ext>
+            </p:extLst>
+          </p:nvPr>
+        </p:nvSpPr>
+        <p:spPr>
+          <a:xfrm>
+            <a:off x="0" y="0"/>
+            <a:ext cx="12189867" cy="6855282"/>
+          </a:xfrm>
+          <a:prstGeom prst="rect">
+            <a:avLst/>
+          </a:prstGeom>
+          <a:ln>
+            <a:noFill/>
+          </a:ln>
+        </p:spPr>
+        <p:style>
+          <a:lnRef idx="2">
+            <a:schemeClr val="accent1">
+              <a:shade val="50000"/>
+            </a:schemeClr>
+          </a:lnRef>
+          <a:fillRef idx="1">
+            <a:schemeClr val="accent1"/>
+          </a:fillRef>
+          <a:effectRef idx="0">
+            <a:schemeClr val="accent1"/>
+          </a:effectRef>
+          <a:fontRef idx="minor">
+            <a:schemeClr val="lt1"/>
+          </a:fontRef>
+        </p:style>
+        <p:txBody>
+          <a:bodyPr rtlCol="0" anchor="ctr"/>
+          <a:lstStyle/>
+          <a:p>
+            <a:pPr algn="ctr"/>
+            <a:endParaRPr lang="en-US"/>
+          </a:p>
+        </p:txBody>
+      </p:sp>
+      <p:pic>
+        <p:nvPicPr>
+          <p:cNvPr id="33" name="Picture 32">
+            <a:extLst>
+              <a:ext uri="{FF2B5EF4-FFF2-40B4-BE49-F238E27FC236}">
+                <a16:creationId xmlns:a16="http://schemas.microsoft.com/office/drawing/2014/main" id="{6A24046D-AAB6-4470-AC22-6448D576E5B5}"/>
+              </a:ext>
+              <a:ext uri="{C183D7F6-B498-43B3-948B-1728B52AA6E4}">
+                <adec:decorative xmlns:adec="http://schemas.microsoft.com/office/drawing/2017/decorative" val="1"/>
+              </a:ext>
+            </a:extLst>
+          </p:cNvPr>
+          <p:cNvPicPr>
+            <a:picLocks noGrp="1" noRot="1" noChangeAspect="1" noMove="1" noResize="1" noEditPoints="1" noAdjustHandles="1" noChangeArrowheads="1" noChangeShapeType="1" noCrop="1"/>
+          </p:cNvPicPr>
+          <p:nvPr>
+            <p:extLst>
+              <p:ext uri="{386F3935-93C4-4BCD-93E2-E3B085C9AB24}">
+                <p16:designElem xmlns:p16="http://schemas.microsoft.com/office/powerpoint/2015/main" val="1"/>
+              </p:ext>
+            </p:extLst>
+          </p:nvPr>
+        </p:nvPicPr>
+        <p:blipFill>
+          <a:blip r:embed="rId3">
+            <a:extLst>
+              <a:ext uri="{28A0092B-C50C-407E-A947-70E740481C1C}">
+                <a14:useLocalDpi xmlns:a14="http://schemas.microsoft.com/office/drawing/2010/main" val="0"/>
+              </a:ext>
+            </a:extLst>
+          </a:blip>
+          <a:stretch>
+            <a:fillRect/>
+          </a:stretch>
+        </p:blipFill>
+        <p:spPr>
+          <a:xfrm>
+            <a:off x="2831794" y="2105202"/>
+            <a:ext cx="9360205" cy="4752798"/>
+          </a:xfrm>
+          <a:prstGeom prst="rect">
+            <a:avLst/>
+          </a:prstGeom>
+        </p:spPr>
+      </p:pic>
+      <p:pic>
+        <p:nvPicPr>
+          <p:cNvPr id="35" name="Picture 34">
+            <a:extLst>
+              <a:ext uri="{FF2B5EF4-FFF2-40B4-BE49-F238E27FC236}">
+                <a16:creationId xmlns:a16="http://schemas.microsoft.com/office/drawing/2014/main" id="{211A0A85-392D-49DA-B9EC-82262B3B9614}"/>
+              </a:ext>
+              <a:ext uri="{C183D7F6-B498-43B3-948B-1728B52AA6E4}">
+                <adec:decorative xmlns:adec="http://schemas.microsoft.com/office/drawing/2017/decorative" val="1"/>
+              </a:ext>
+            </a:extLst>
+          </p:cNvPr>
+          <p:cNvPicPr>
+            <a:picLocks noGrp="1" noRot="1" noChangeAspect="1" noMove="1" noResize="1" noEditPoints="1" noAdjustHandles="1" noChangeArrowheads="1" noChangeShapeType="1" noCrop="1"/>
+          </p:cNvPicPr>
+          <p:nvPr>
+            <p:extLst>
+              <p:ext uri="{386F3935-93C4-4BCD-93E2-E3B085C9AB24}">
+                <p16:designElem xmlns:p16="http://schemas.microsoft.com/office/powerpoint/2015/main" val="1"/>
+              </p:ext>
+            </p:extLst>
+          </p:nvPr>
+        </p:nvPicPr>
+        <p:blipFill>
+          <a:blip r:embed="rId4">
+            <a:alphaModFix/>
+            <a:extLst>
+              <a:ext uri="{28A0092B-C50C-407E-A947-70E740481C1C}">
+                <a14:useLocalDpi xmlns:a14="http://schemas.microsoft.com/office/drawing/2010/main" val="0"/>
+              </a:ext>
+            </a:extLst>
+          </a:blip>
+          <a:stretch>
+            <a:fillRect/>
+          </a:stretch>
+        </p:blipFill>
+        <p:spPr>
+          <a:xfrm>
+            <a:off x="0" y="0"/>
+            <a:ext cx="12189867" cy="6858000"/>
+          </a:xfrm>
+          <a:prstGeom prst="rect">
+            <a:avLst/>
+          </a:prstGeom>
+        </p:spPr>
+      </p:pic>
+      <p:sp>
+        <p:nvSpPr>
+          <p:cNvPr id="37" name="Rectangle 36">
+            <a:extLst>
+              <a:ext uri="{FF2B5EF4-FFF2-40B4-BE49-F238E27FC236}">
+                <a16:creationId xmlns:a16="http://schemas.microsoft.com/office/drawing/2014/main" id="{73AFD74C-283C-45BD-885B-6E6635E4B3F1}"/>
+              </a:ext>
+              <a:ext uri="{C183D7F6-B498-43B3-948B-1728B52AA6E4}">
+                <adec:decorative xmlns:adec="http://schemas.microsoft.com/office/drawing/2017/decorative" val="1"/>
+              </a:ext>
+            </a:extLst>
+          </p:cNvPr>
+          <p:cNvSpPr>
+            <a:spLocks noGrp="1" noRot="1" noChangeAspect="1" noMove="1" noResize="1" noEditPoints="1" noAdjustHandles="1" noChangeArrowheads="1" noChangeShapeType="1" noTextEdit="1"/>
+          </p:cNvSpPr>
+          <p:nvPr>
+            <p:extLst>
+              <p:ext uri="{386F3935-93C4-4BCD-93E2-E3B085C9AB24}">
+                <p16:designElem xmlns:p16="http://schemas.microsoft.com/office/powerpoint/2015/main" val="1"/>
+              </p:ext>
+            </p:extLst>
+          </p:nvPr>
+        </p:nvSpPr>
+        <p:spPr>
+          <a:xfrm>
+            <a:off x="0" y="0"/>
+            <a:ext cx="964174" cy="6858000"/>
+          </a:xfrm>
+          <a:prstGeom prst="rect">
+            <a:avLst/>
+          </a:prstGeom>
+          <a:solidFill>
+            <a:schemeClr val="bg2"/>
+          </a:solidFill>
+          <a:ln>
+            <a:noFill/>
+          </a:ln>
+        </p:spPr>
+        <p:style>
+          <a:lnRef idx="2">
+            <a:schemeClr val="accent1">
+              <a:shade val="50000"/>
+            </a:schemeClr>
+          </a:lnRef>
+          <a:fillRef idx="1">
+            <a:schemeClr val="accent1"/>
+          </a:fillRef>
+          <a:effectRef idx="0">
+            <a:schemeClr val="accent1"/>
+          </a:effectRef>
+          <a:fontRef idx="minor">
+            <a:schemeClr val="lt1"/>
+          </a:fontRef>
+        </p:style>
+        <p:txBody>
+          <a:bodyPr rtlCol="0" anchor="ctr"/>
+          <a:lstStyle/>
+          <a:p>
+            <a:pPr algn="ctr"/>
+            <a:endParaRPr lang="en-US"/>
+          </a:p>
+        </p:txBody>
+      </p:sp>
+      <p:sp>
+        <p:nvSpPr>
+          <p:cNvPr id="39" name="Rectangle 38">
+            <a:extLst>
+              <a:ext uri="{FF2B5EF4-FFF2-40B4-BE49-F238E27FC236}">
+                <a16:creationId xmlns:a16="http://schemas.microsoft.com/office/drawing/2014/main" id="{CE3DE725-FEB0-422F-BDBA-A29C95768A3F}"/>
+              </a:ext>
+              <a:ext uri="{C183D7F6-B498-43B3-948B-1728B52AA6E4}">
+                <adec:decorative xmlns:adec="http://schemas.microsoft.com/office/drawing/2017/decorative" val="1"/>
+              </a:ext>
+            </a:extLst>
+          </p:cNvPr>
+          <p:cNvSpPr>
+            <a:spLocks noGrp="1" noRot="1" noChangeAspect="1" noMove="1" noResize="1" noEditPoints="1" noAdjustHandles="1" noChangeArrowheads="1" noChangeShapeType="1" noTextEdit="1"/>
+          </p:cNvSpPr>
+          <p:nvPr>
+            <p:extLst>
+              <p:ext uri="{386F3935-93C4-4BCD-93E2-E3B085C9AB24}">
+                <p16:designElem xmlns:p16="http://schemas.microsoft.com/office/powerpoint/2015/main" val="1"/>
+              </p:ext>
+            </p:extLst>
+          </p:nvPr>
+        </p:nvSpPr>
+        <p:spPr>
+          <a:xfrm>
+            <a:off x="962042" y="0"/>
+            <a:ext cx="45719" cy="6858000"/>
+          </a:xfrm>
+          <a:prstGeom prst="rect">
+            <a:avLst/>
+          </a:prstGeom>
+          <a:solidFill>
+            <a:schemeClr val="accent6"/>
+          </a:solidFill>
+          <a:ln>
+            <a:noFill/>
+          </a:ln>
+        </p:spPr>
+        <p:style>
+          <a:lnRef idx="2">
+            <a:schemeClr val="accent1">
+              <a:shade val="50000"/>
+            </a:schemeClr>
+          </a:lnRef>
+          <a:fillRef idx="1">
+            <a:schemeClr val="accent1"/>
+          </a:fillRef>
+          <a:effectRef idx="0">
+            <a:schemeClr val="accent1"/>
+          </a:effectRef>
+          <a:fontRef idx="minor">
+            <a:schemeClr val="lt1"/>
+          </a:fontRef>
+        </p:style>
+        <p:txBody>
+          <a:bodyPr rtlCol="0" anchor="ctr"/>
+          <a:lstStyle/>
+          <a:p>
+            <a:pPr algn="ctr"/>
+            <a:endParaRPr lang="en-US"/>
+          </a:p>
+        </p:txBody>
+      </p:sp>
+      <p:sp>
+        <p:nvSpPr>
+          <p:cNvPr id="41" name="Rectangle 40">
+            <a:extLst>
+              <a:ext uri="{FF2B5EF4-FFF2-40B4-BE49-F238E27FC236}">
+                <a16:creationId xmlns:a16="http://schemas.microsoft.com/office/drawing/2014/main" id="{05058156-257B-4118-BA50-5869C8AF6AD7}"/>
+              </a:ext>
+              <a:ext uri="{C183D7F6-B498-43B3-948B-1728B52AA6E4}">
+                <adec:decorative xmlns:adec="http://schemas.microsoft.com/office/drawing/2017/decorative" val="1"/>
+              </a:ext>
+            </a:extLst>
+          </p:cNvPr>
+          <p:cNvSpPr>
+            <a:spLocks noGrp="1" noRot="1" noChangeAspect="1" noMove="1" noResize="1" noEditPoints="1" noAdjustHandles="1" noChangeArrowheads="1" noChangeShapeType="1" noTextEdit="1"/>
+          </p:cNvSpPr>
+          <p:nvPr>
+            <p:extLst>
+              <p:ext uri="{386F3935-93C4-4BCD-93E2-E3B085C9AB24}">
+                <p16:designElem xmlns:p16="http://schemas.microsoft.com/office/powerpoint/2015/main" val="1"/>
+              </p:ext>
+            </p:extLst>
+          </p:nvPr>
+        </p:nvSpPr>
+        <p:spPr>
+          <a:xfrm>
+            <a:off x="1007533" y="0"/>
+            <a:ext cx="10378001" cy="6858000"/>
+          </a:xfrm>
+          <a:prstGeom prst="rect">
+            <a:avLst/>
+          </a:prstGeom>
+          <a:solidFill>
+            <a:schemeClr val="bg2">
+              <a:alpha val="92000"/>
+            </a:schemeClr>
+          </a:solidFill>
+          <a:ln>
+            <a:noFill/>
+          </a:ln>
+        </p:spPr>
+        <p:style>
+          <a:lnRef idx="2">
+            <a:schemeClr val="accent1">
+              <a:shade val="50000"/>
+            </a:schemeClr>
+          </a:lnRef>
+          <a:fillRef idx="1">
+            <a:schemeClr val="accent1"/>
+          </a:fillRef>
+          <a:effectRef idx="0">
+            <a:schemeClr val="accent1"/>
+          </a:effectRef>
+          <a:fontRef idx="minor">
+            <a:schemeClr val="lt1"/>
+          </a:fontRef>
+        </p:style>
+        <p:txBody>
+          <a:bodyPr rtlCol="0" anchor="ctr"/>
+          <a:lstStyle/>
+          <a:p>
+            <a:pPr algn="ctr"/>
+            <a:endParaRPr lang="en-US"/>
+          </a:p>
+        </p:txBody>
+      </p:sp>
+      <p:pic>
+        <p:nvPicPr>
+          <p:cNvPr id="7" name="Content Placeholder 6">
+            <a:extLst>
+              <a:ext uri="{FF2B5EF4-FFF2-40B4-BE49-F238E27FC236}">
+                <a16:creationId xmlns:a16="http://schemas.microsoft.com/office/drawing/2014/main" id="{DDB867B2-5033-CAA1-4EFB-489AD91F2D11}"/>
+              </a:ext>
+            </a:extLst>
+          </p:cNvPr>
+          <p:cNvPicPr>
+            <a:picLocks noChangeAspect="1"/>
+          </p:cNvPicPr>
+          <p:nvPr/>
+        </p:nvPicPr>
+        <p:blipFill>
+          <a:blip r:embed="rId5"/>
+          <a:srcRect/>
+          <a:stretch/>
+        </p:blipFill>
+        <p:spPr>
+          <a:xfrm>
+            <a:off x="1968263" y="1263090"/>
+            <a:ext cx="8253336" cy="5051834"/>
+          </a:xfrm>
+          <a:prstGeom prst="rect">
+            <a:avLst/>
+          </a:prstGeom>
+          <a:ln>
+            <a:gradFill flip="none" rotWithShape="1">
+              <a:gsLst>
+                <a:gs pos="86000">
+                  <a:schemeClr val="accent6">
+                    <a:lumMod val="67000"/>
+                  </a:schemeClr>
+                </a:gs>
+                <a:gs pos="20000">
+                  <a:schemeClr val="accent6">
+                    <a:lumMod val="97000"/>
+                    <a:lumOff val="3000"/>
+                  </a:schemeClr>
+                </a:gs>
+                <a:gs pos="100000">
+                  <a:schemeClr val="accent6">
+                    <a:lumMod val="60000"/>
+                    <a:lumOff val="40000"/>
+                  </a:schemeClr>
+                </a:gs>
+              </a:gsLst>
+              <a:lin ang="16200000" scaled="1"/>
+              <a:tileRect/>
+            </a:gradFill>
+          </a:ln>
+          <a:effectLst>
+            <a:innerShdw blurRad="127000">
+              <a:prstClr val="black">
+                <a:alpha val="90000"/>
+              </a:prstClr>
+            </a:innerShdw>
+          </a:effectLst>
+        </p:spPr>
+      </p:pic>
+      <p:sp>
+        <p:nvSpPr>
+          <p:cNvPr id="43" name="Rectangle 42">
+            <a:extLst>
+              <a:ext uri="{FF2B5EF4-FFF2-40B4-BE49-F238E27FC236}">
+                <a16:creationId xmlns:a16="http://schemas.microsoft.com/office/drawing/2014/main" id="{D23B4D99-FEA8-489A-8436-A2F113BE1B6E}"/>
+              </a:ext>
+              <a:ext uri="{C183D7F6-B498-43B3-948B-1728B52AA6E4}">
+                <adec:decorative xmlns:adec="http://schemas.microsoft.com/office/drawing/2017/decorative" val="1"/>
+              </a:ext>
+            </a:extLst>
+          </p:cNvPr>
+          <p:cNvSpPr>
+            <a:spLocks noGrp="1" noRot="1" noChangeAspect="1" noMove="1" noResize="1" noEditPoints="1" noAdjustHandles="1" noChangeArrowheads="1" noChangeShapeType="1" noTextEdit="1"/>
+          </p:cNvSpPr>
+          <p:nvPr>
+            <p:extLst>
+              <p:ext uri="{386F3935-93C4-4BCD-93E2-E3B085C9AB24}">
+                <p16:designElem xmlns:p16="http://schemas.microsoft.com/office/powerpoint/2015/main" val="1"/>
+              </p:ext>
+            </p:extLst>
+          </p:nvPr>
+        </p:nvSpPr>
+        <p:spPr>
+          <a:xfrm>
+            <a:off x="11387666" y="-2718"/>
+            <a:ext cx="27432" cy="6858000"/>
+          </a:xfrm>
+          <a:prstGeom prst="rect">
+            <a:avLst/>
+          </a:prstGeom>
+          <a:solidFill>
+            <a:schemeClr val="accent6"/>
+          </a:solidFill>
+          <a:ln>
+            <a:noFill/>
+          </a:ln>
+        </p:spPr>
+        <p:style>
+          <a:lnRef idx="2">
+            <a:schemeClr val="accent1">
+              <a:shade val="50000"/>
+            </a:schemeClr>
+          </a:lnRef>
+          <a:fillRef idx="1">
+            <a:schemeClr val="accent1"/>
+          </a:fillRef>
+          <a:effectRef idx="0">
+            <a:schemeClr val="accent1"/>
+          </a:effectRef>
+          <a:fontRef idx="minor">
+            <a:schemeClr val="lt1"/>
+          </a:fontRef>
+        </p:style>
+        <p:txBody>
+          <a:bodyPr rtlCol="0" anchor="ctr"/>
+          <a:lstStyle/>
+          <a:p>
+            <a:pPr algn="ctr"/>
+            <a:endParaRPr lang="en-US"/>
+          </a:p>
+        </p:txBody>
+      </p:sp>
+      <p:sp>
+        <p:nvSpPr>
+          <p:cNvPr id="8" name="Title 1">
+            <a:extLst>
+              <a:ext uri="{FF2B5EF4-FFF2-40B4-BE49-F238E27FC236}">
+                <a16:creationId xmlns:a16="http://schemas.microsoft.com/office/drawing/2014/main" id="{780578A0-2D91-03E7-331D-C72C38A11101}"/>
+              </a:ext>
+            </a:extLst>
+          </p:cNvPr>
+          <p:cNvSpPr txBox="1">
+            <a:spLocks/>
+          </p:cNvSpPr>
+          <p:nvPr/>
+        </p:nvSpPr>
+        <p:spPr>
+          <a:xfrm>
+            <a:off x="2069979" y="185861"/>
+            <a:ext cx="8253336" cy="1077229"/>
+          </a:xfrm>
+          <a:prstGeom prst="rect">
+            <a:avLst/>
+          </a:prstGeom>
+        </p:spPr>
+        <p:txBody>
+          <a:bodyPr vert="horz" lIns="91440" tIns="45720" rIns="91440" bIns="45720" rtlCol="0" anchor="t">
+            <a:normAutofit lnSpcReduction="10000"/>
+          </a:bodyPr>
+          <a:lstStyle>
+            <a:lvl1pPr algn="r" defTabSz="914400" rtl="0" eaLnBrk="1" latinLnBrk="0" hangingPunct="1">
+              <a:lnSpc>
+                <a:spcPct val="90000"/>
+              </a:lnSpc>
+              <a:spcBef>
+                <a:spcPct val="0"/>
+              </a:spcBef>
+              <a:buNone/>
+              <a:defRPr sz="3400" b="0" i="0" kern="1200" cap="none">
+                <a:solidFill>
+                  <a:schemeClr val="tx1"/>
+                </a:solidFill>
+                <a:effectLst/>
+                <a:latin typeface="+mj-lt"/>
+                <a:ea typeface="+mj-ea"/>
+                <a:cs typeface="+mj-cs"/>
+              </a:defRPr>
+            </a:lvl1pPr>
+          </a:lstStyle>
+          <a:p>
+            <a:pPr algn="l"/>
+            <a:r>
+              <a:rPr lang="en-US" sz="3600" dirty="0"/>
+              <a:t>Two Sample Distributions Showing Rejection of Null Hypothesis</a:t>
+            </a:r>
+            <a:endParaRPr lang="en-US" sz="2000" dirty="0"/>
+          </a:p>
+        </p:txBody>
+      </p:sp>
+    </p:spTree>
+    <p:extLst>
+      <p:ext uri="{BB962C8B-B14F-4D97-AF65-F5344CB8AC3E}">
+        <p14:creationId xmlns:p14="http://schemas.microsoft.com/office/powerpoint/2010/main" val="996664661"/>
+      </p:ext>
+    </p:extLst>
+  </p:cSld>
+  <p:clrMapOvr>
+    <a:masterClrMapping/>
+  </p:clrMapOvr>
+</p:sld>
+</file>
+
+<file path=ppt/slides/slide8.xml><?xml version="1.0" encoding="utf-8"?>
+<p:sld xmlns:a="http://schemas.openxmlformats.org/drawingml/2006/main" xmlns:r="http://schemas.openxmlformats.org/officeDocument/2006/relationships" xmlns:p="http://schemas.openxmlformats.org/presentationml/2006/main">
+  <p:cSld>
+    <p:bg>
+      <p:bgPr>
+        <a:blipFill rotWithShape="1">
+          <a:blip r:embed="rId2"/>
+          <a:stretch/>
+        </a:blipFill>
+        <a:effectLst/>
+      </p:bgPr>
+    </p:bg>
+    <p:spTree>
+      <p:nvGrpSpPr>
+        <p:cNvPr id="1" name=""/>
+        <p:cNvGrpSpPr/>
+        <p:nvPr/>
+      </p:nvGrpSpPr>
+      <p:grpSpPr>
+        <a:xfrm>
+          <a:off x="0" y="0"/>
+          <a:ext cx="0" cy="0"/>
+          <a:chOff x="0" y="0"/>
+          <a:chExt cx="0" cy="0"/>
+        </a:xfrm>
+      </p:grpSpPr>
+      <p:sp useBgFill="1">
+        <p:nvSpPr>
+          <p:cNvPr id="31" name="Rectangle 30">
+            <a:extLst>
+              <a:ext uri="{FF2B5EF4-FFF2-40B4-BE49-F238E27FC236}">
+                <a16:creationId xmlns:a16="http://schemas.microsoft.com/office/drawing/2014/main" id="{9B0F3308-12C4-4DD7-ABB4-D0DFAA3CF6DE}"/>
+              </a:ext>
+              <a:ext uri="{C183D7F6-B498-43B3-948B-1728B52AA6E4}">
+                <adec:decorative xmlns:adec="http://schemas.microsoft.com/office/drawing/2017/decorative" val="1"/>
+              </a:ext>
+            </a:extLst>
+          </p:cNvPr>
+          <p:cNvSpPr>
+            <a:spLocks noGrp="1" noRot="1" noChangeAspect="1" noMove="1" noResize="1" noEditPoints="1" noAdjustHandles="1" noChangeArrowheads="1" noChangeShapeType="1" noTextEdit="1"/>
+          </p:cNvSpPr>
+          <p:nvPr>
+            <p:extLst>
+              <p:ext uri="{386F3935-93C4-4BCD-93E2-E3B085C9AB24}">
+                <p16:designElem xmlns:p16="http://schemas.microsoft.com/office/powerpoint/2015/main" val="1"/>
+              </p:ext>
+            </p:extLst>
+          </p:nvPr>
+        </p:nvSpPr>
+        <p:spPr>
+          <a:xfrm>
+            <a:off x="0" y="0"/>
+            <a:ext cx="12189867" cy="6855282"/>
+          </a:xfrm>
+          <a:prstGeom prst="rect">
+            <a:avLst/>
+          </a:prstGeom>
+          <a:ln>
+            <a:noFill/>
+          </a:ln>
+        </p:spPr>
+        <p:style>
+          <a:lnRef idx="2">
+            <a:schemeClr val="accent1">
+              <a:shade val="50000"/>
+            </a:schemeClr>
+          </a:lnRef>
+          <a:fillRef idx="1">
+            <a:schemeClr val="accent1"/>
+          </a:fillRef>
+          <a:effectRef idx="0">
+            <a:schemeClr val="accent1"/>
+          </a:effectRef>
+          <a:fontRef idx="minor">
+            <a:schemeClr val="lt1"/>
+          </a:fontRef>
+        </p:style>
+        <p:txBody>
+          <a:bodyPr rtlCol="0" anchor="ctr"/>
+          <a:lstStyle/>
+          <a:p>
+            <a:pPr algn="ctr"/>
+            <a:endParaRPr lang="en-US"/>
+          </a:p>
+        </p:txBody>
+      </p:sp>
+      <p:pic>
+        <p:nvPicPr>
+          <p:cNvPr id="33" name="Picture 32">
+            <a:extLst>
+              <a:ext uri="{FF2B5EF4-FFF2-40B4-BE49-F238E27FC236}">
+                <a16:creationId xmlns:a16="http://schemas.microsoft.com/office/drawing/2014/main" id="{6A24046D-AAB6-4470-AC22-6448D576E5B5}"/>
+              </a:ext>
+              <a:ext uri="{C183D7F6-B498-43B3-948B-1728B52AA6E4}">
+                <adec:decorative xmlns:adec="http://schemas.microsoft.com/office/drawing/2017/decorative" val="1"/>
+              </a:ext>
+            </a:extLst>
+          </p:cNvPr>
+          <p:cNvPicPr>
+            <a:picLocks noGrp="1" noRot="1" noChangeAspect="1" noMove="1" noResize="1" noEditPoints="1" noAdjustHandles="1" noChangeArrowheads="1" noChangeShapeType="1" noCrop="1"/>
+          </p:cNvPicPr>
+          <p:nvPr>
+            <p:extLst>
+              <p:ext uri="{386F3935-93C4-4BCD-93E2-E3B085C9AB24}">
+                <p16:designElem xmlns:p16="http://schemas.microsoft.com/office/powerpoint/2015/main" val="1"/>
+              </p:ext>
+            </p:extLst>
+          </p:nvPr>
+        </p:nvPicPr>
+        <p:blipFill>
+          <a:blip r:embed="rId3">
+            <a:extLst>
+              <a:ext uri="{28A0092B-C50C-407E-A947-70E740481C1C}">
+                <a14:useLocalDpi xmlns:a14="http://schemas.microsoft.com/office/drawing/2010/main" val="0"/>
+              </a:ext>
+            </a:extLst>
+          </a:blip>
+          <a:stretch>
+            <a:fillRect/>
+          </a:stretch>
+        </p:blipFill>
+        <p:spPr>
+          <a:xfrm>
+            <a:off x="2831794" y="2105202"/>
+            <a:ext cx="9360205" cy="4752798"/>
+          </a:xfrm>
+          <a:prstGeom prst="rect">
+            <a:avLst/>
+          </a:prstGeom>
+        </p:spPr>
+      </p:pic>
+      <p:pic>
+        <p:nvPicPr>
+          <p:cNvPr id="35" name="Picture 34">
+            <a:extLst>
+              <a:ext uri="{FF2B5EF4-FFF2-40B4-BE49-F238E27FC236}">
+                <a16:creationId xmlns:a16="http://schemas.microsoft.com/office/drawing/2014/main" id="{211A0A85-392D-49DA-B9EC-82262B3B9614}"/>
+              </a:ext>
+              <a:ext uri="{C183D7F6-B498-43B3-948B-1728B52AA6E4}">
+                <adec:decorative xmlns:adec="http://schemas.microsoft.com/office/drawing/2017/decorative" val="1"/>
+              </a:ext>
+            </a:extLst>
+          </p:cNvPr>
+          <p:cNvPicPr>
+            <a:picLocks noGrp="1" noRot="1" noChangeAspect="1" noMove="1" noResize="1" noEditPoints="1" noAdjustHandles="1" noChangeArrowheads="1" noChangeShapeType="1" noCrop="1"/>
+          </p:cNvPicPr>
+          <p:nvPr>
+            <p:extLst>
+              <p:ext uri="{386F3935-93C4-4BCD-93E2-E3B085C9AB24}">
+                <p16:designElem xmlns:p16="http://schemas.microsoft.com/office/powerpoint/2015/main" val="1"/>
+              </p:ext>
+            </p:extLst>
+          </p:nvPr>
+        </p:nvPicPr>
+        <p:blipFill>
+          <a:blip r:embed="rId4">
+            <a:alphaModFix/>
+            <a:extLst>
+              <a:ext uri="{28A0092B-C50C-407E-A947-70E740481C1C}">
+                <a14:useLocalDpi xmlns:a14="http://schemas.microsoft.com/office/drawing/2010/main" val="0"/>
+              </a:ext>
+            </a:extLst>
+          </a:blip>
+          <a:stretch>
+            <a:fillRect/>
+          </a:stretch>
+        </p:blipFill>
+        <p:spPr>
+          <a:xfrm>
+            <a:off x="0" y="0"/>
+            <a:ext cx="12189867" cy="6858000"/>
+          </a:xfrm>
+          <a:prstGeom prst="rect">
+            <a:avLst/>
+          </a:prstGeom>
+        </p:spPr>
+      </p:pic>
+      <p:sp>
+        <p:nvSpPr>
+          <p:cNvPr id="37" name="Rectangle 36">
+            <a:extLst>
+              <a:ext uri="{FF2B5EF4-FFF2-40B4-BE49-F238E27FC236}">
+                <a16:creationId xmlns:a16="http://schemas.microsoft.com/office/drawing/2014/main" id="{73AFD74C-283C-45BD-885B-6E6635E4B3F1}"/>
+              </a:ext>
+              <a:ext uri="{C183D7F6-B498-43B3-948B-1728B52AA6E4}">
+                <adec:decorative xmlns:adec="http://schemas.microsoft.com/office/drawing/2017/decorative" val="1"/>
+              </a:ext>
+            </a:extLst>
+          </p:cNvPr>
+          <p:cNvSpPr>
+            <a:spLocks noGrp="1" noRot="1" noChangeAspect="1" noMove="1" noResize="1" noEditPoints="1" noAdjustHandles="1" noChangeArrowheads="1" noChangeShapeType="1" noTextEdit="1"/>
+          </p:cNvSpPr>
+          <p:nvPr>
+            <p:extLst>
+              <p:ext uri="{386F3935-93C4-4BCD-93E2-E3B085C9AB24}">
+                <p16:designElem xmlns:p16="http://schemas.microsoft.com/office/powerpoint/2015/main" val="1"/>
+              </p:ext>
+            </p:extLst>
+          </p:nvPr>
+        </p:nvSpPr>
+        <p:spPr>
+          <a:xfrm>
+            <a:off x="0" y="0"/>
+            <a:ext cx="964174" cy="6858000"/>
+          </a:xfrm>
+          <a:prstGeom prst="rect">
+            <a:avLst/>
+          </a:prstGeom>
+          <a:solidFill>
+            <a:schemeClr val="bg2"/>
+          </a:solidFill>
+          <a:ln>
+            <a:noFill/>
+          </a:ln>
+        </p:spPr>
+        <p:style>
+          <a:lnRef idx="2">
+            <a:schemeClr val="accent1">
+              <a:shade val="50000"/>
+            </a:schemeClr>
+          </a:lnRef>
+          <a:fillRef idx="1">
+            <a:schemeClr val="accent1"/>
+          </a:fillRef>
+          <a:effectRef idx="0">
+            <a:schemeClr val="accent1"/>
+          </a:effectRef>
+          <a:fontRef idx="minor">
+            <a:schemeClr val="lt1"/>
+          </a:fontRef>
+        </p:style>
+        <p:txBody>
+          <a:bodyPr rtlCol="0" anchor="ctr"/>
+          <a:lstStyle/>
+          <a:p>
+            <a:pPr algn="ctr"/>
+            <a:endParaRPr lang="en-US"/>
+          </a:p>
+        </p:txBody>
+      </p:sp>
+      <p:sp>
+        <p:nvSpPr>
+          <p:cNvPr id="39" name="Rectangle 38">
+            <a:extLst>
+              <a:ext uri="{FF2B5EF4-FFF2-40B4-BE49-F238E27FC236}">
+                <a16:creationId xmlns:a16="http://schemas.microsoft.com/office/drawing/2014/main" id="{CE3DE725-FEB0-422F-BDBA-A29C95768A3F}"/>
+              </a:ext>
+              <a:ext uri="{C183D7F6-B498-43B3-948B-1728B52AA6E4}">
+                <adec:decorative xmlns:adec="http://schemas.microsoft.com/office/drawing/2017/decorative" val="1"/>
+              </a:ext>
+            </a:extLst>
+          </p:cNvPr>
+          <p:cNvSpPr>
+            <a:spLocks noGrp="1" noRot="1" noChangeAspect="1" noMove="1" noResize="1" noEditPoints="1" noAdjustHandles="1" noChangeArrowheads="1" noChangeShapeType="1" noTextEdit="1"/>
+          </p:cNvSpPr>
+          <p:nvPr>
+            <p:extLst>
+              <p:ext uri="{386F3935-93C4-4BCD-93E2-E3B085C9AB24}">
+                <p16:designElem xmlns:p16="http://schemas.microsoft.com/office/powerpoint/2015/main" val="1"/>
+              </p:ext>
+            </p:extLst>
+          </p:nvPr>
+        </p:nvSpPr>
+        <p:spPr>
+          <a:xfrm>
+            <a:off x="962042" y="0"/>
+            <a:ext cx="45719" cy="6858000"/>
+          </a:xfrm>
+          <a:prstGeom prst="rect">
+            <a:avLst/>
+          </a:prstGeom>
+          <a:solidFill>
+            <a:schemeClr val="accent6"/>
+          </a:solidFill>
+          <a:ln>
+            <a:noFill/>
+          </a:ln>
+        </p:spPr>
+        <p:style>
+          <a:lnRef idx="2">
+            <a:schemeClr val="accent1">
+              <a:shade val="50000"/>
+            </a:schemeClr>
+          </a:lnRef>
+          <a:fillRef idx="1">
+            <a:schemeClr val="accent1"/>
+          </a:fillRef>
+          <a:effectRef idx="0">
+            <a:schemeClr val="accent1"/>
+          </a:effectRef>
+          <a:fontRef idx="minor">
+            <a:schemeClr val="lt1"/>
+          </a:fontRef>
+        </p:style>
+        <p:txBody>
+          <a:bodyPr rtlCol="0" anchor="ctr"/>
+          <a:lstStyle/>
+          <a:p>
+            <a:pPr algn="ctr"/>
+            <a:endParaRPr lang="en-US"/>
+          </a:p>
+        </p:txBody>
+      </p:sp>
+      <p:sp>
+        <p:nvSpPr>
+          <p:cNvPr id="41" name="Rectangle 40">
+            <a:extLst>
+              <a:ext uri="{FF2B5EF4-FFF2-40B4-BE49-F238E27FC236}">
+                <a16:creationId xmlns:a16="http://schemas.microsoft.com/office/drawing/2014/main" id="{05058156-257B-4118-BA50-5869C8AF6AD7}"/>
+              </a:ext>
+              <a:ext uri="{C183D7F6-B498-43B3-948B-1728B52AA6E4}">
+                <adec:decorative xmlns:adec="http://schemas.microsoft.com/office/drawing/2017/decorative" val="1"/>
+              </a:ext>
+            </a:extLst>
+          </p:cNvPr>
+          <p:cNvSpPr>
+            <a:spLocks noGrp="1" noRot="1" noChangeAspect="1" noMove="1" noResize="1" noEditPoints="1" noAdjustHandles="1" noChangeArrowheads="1" noChangeShapeType="1" noTextEdit="1"/>
+          </p:cNvSpPr>
+          <p:nvPr>
+            <p:extLst>
+              <p:ext uri="{386F3935-93C4-4BCD-93E2-E3B085C9AB24}">
+                <p16:designElem xmlns:p16="http://schemas.microsoft.com/office/powerpoint/2015/main" val="1"/>
+              </p:ext>
+            </p:extLst>
+          </p:nvPr>
+        </p:nvSpPr>
+        <p:spPr>
+          <a:xfrm>
+            <a:off x="1007533" y="0"/>
+            <a:ext cx="10378001" cy="6858000"/>
+          </a:xfrm>
+          <a:prstGeom prst="rect">
+            <a:avLst/>
+          </a:prstGeom>
+          <a:solidFill>
+            <a:schemeClr val="bg2">
+              <a:alpha val="92000"/>
+            </a:schemeClr>
+          </a:solidFill>
+          <a:ln>
+            <a:noFill/>
+          </a:ln>
+        </p:spPr>
+        <p:style>
+          <a:lnRef idx="2">
+            <a:schemeClr val="accent1">
+              <a:shade val="50000"/>
+            </a:schemeClr>
+          </a:lnRef>
+          <a:fillRef idx="1">
+            <a:schemeClr val="accent1"/>
+          </a:fillRef>
+          <a:effectRef idx="0">
+            <a:schemeClr val="accent1"/>
+          </a:effectRef>
+          <a:fontRef idx="minor">
+            <a:schemeClr val="lt1"/>
+          </a:fontRef>
+        </p:style>
+        <p:txBody>
+          <a:bodyPr rtlCol="0" anchor="ctr"/>
+          <a:lstStyle/>
+          <a:p>
+            <a:pPr algn="ctr"/>
+            <a:endParaRPr lang="en-US"/>
+          </a:p>
+        </p:txBody>
+      </p:sp>
+      <p:pic>
+        <p:nvPicPr>
+          <p:cNvPr id="7" name="Content Placeholder 6">
+            <a:extLst>
+              <a:ext uri="{FF2B5EF4-FFF2-40B4-BE49-F238E27FC236}">
+                <a16:creationId xmlns:a16="http://schemas.microsoft.com/office/drawing/2014/main" id="{DDB867B2-5033-CAA1-4EFB-489AD91F2D11}"/>
+              </a:ext>
+            </a:extLst>
+          </p:cNvPr>
+          <p:cNvPicPr>
+            <a:picLocks noChangeAspect="1"/>
+          </p:cNvPicPr>
+          <p:nvPr/>
+        </p:nvPicPr>
+        <p:blipFill>
+          <a:blip r:embed="rId5"/>
+          <a:srcRect/>
+          <a:stretch/>
+        </p:blipFill>
+        <p:spPr>
+          <a:xfrm>
+            <a:off x="1968263" y="1263090"/>
+            <a:ext cx="8253336" cy="5051833"/>
+          </a:xfrm>
+          <a:prstGeom prst="rect">
+            <a:avLst/>
+          </a:prstGeom>
+          <a:ln>
+            <a:gradFill flip="none" rotWithShape="1">
+              <a:gsLst>
+                <a:gs pos="86000">
+                  <a:schemeClr val="accent6">
+                    <a:lumMod val="67000"/>
+                  </a:schemeClr>
+                </a:gs>
+                <a:gs pos="20000">
+                  <a:schemeClr val="accent6">
+                    <a:lumMod val="97000"/>
+                    <a:lumOff val="3000"/>
+                  </a:schemeClr>
+                </a:gs>
+                <a:gs pos="100000">
+                  <a:schemeClr val="accent6">
+                    <a:lumMod val="60000"/>
+                    <a:lumOff val="40000"/>
+                  </a:schemeClr>
+                </a:gs>
+              </a:gsLst>
+              <a:lin ang="16200000" scaled="1"/>
+              <a:tileRect/>
+            </a:gradFill>
+          </a:ln>
+          <a:effectLst>
+            <a:innerShdw blurRad="127000">
+              <a:prstClr val="black">
+                <a:alpha val="90000"/>
+              </a:prstClr>
+            </a:innerShdw>
+          </a:effectLst>
+        </p:spPr>
+      </p:pic>
+      <p:sp>
+        <p:nvSpPr>
+          <p:cNvPr id="43" name="Rectangle 42">
+            <a:extLst>
+              <a:ext uri="{FF2B5EF4-FFF2-40B4-BE49-F238E27FC236}">
+                <a16:creationId xmlns:a16="http://schemas.microsoft.com/office/drawing/2014/main" id="{D23B4D99-FEA8-489A-8436-A2F113BE1B6E}"/>
+              </a:ext>
+              <a:ext uri="{C183D7F6-B498-43B3-948B-1728B52AA6E4}">
+                <adec:decorative xmlns:adec="http://schemas.microsoft.com/office/drawing/2017/decorative" val="1"/>
+              </a:ext>
+            </a:extLst>
+          </p:cNvPr>
+          <p:cNvSpPr>
+            <a:spLocks noGrp="1" noRot="1" noChangeAspect="1" noMove="1" noResize="1" noEditPoints="1" noAdjustHandles="1" noChangeArrowheads="1" noChangeShapeType="1" noTextEdit="1"/>
+          </p:cNvSpPr>
+          <p:nvPr>
+            <p:extLst>
+              <p:ext uri="{386F3935-93C4-4BCD-93E2-E3B085C9AB24}">
+                <p16:designElem xmlns:p16="http://schemas.microsoft.com/office/powerpoint/2015/main" val="1"/>
+              </p:ext>
+            </p:extLst>
+          </p:nvPr>
+        </p:nvSpPr>
+        <p:spPr>
+          <a:xfrm>
+            <a:off x="11387666" y="-2718"/>
+            <a:ext cx="27432" cy="6858000"/>
+          </a:xfrm>
+          <a:prstGeom prst="rect">
+            <a:avLst/>
+          </a:prstGeom>
+          <a:solidFill>
+            <a:schemeClr val="accent6"/>
+          </a:solidFill>
+          <a:ln>
+            <a:noFill/>
+          </a:ln>
+        </p:spPr>
+        <p:style>
+          <a:lnRef idx="2">
+            <a:schemeClr val="accent1">
+              <a:shade val="50000"/>
+            </a:schemeClr>
+          </a:lnRef>
+          <a:fillRef idx="1">
+            <a:schemeClr val="accent1"/>
+          </a:fillRef>
+          <a:effectRef idx="0">
+            <a:schemeClr val="accent1"/>
+          </a:effectRef>
+          <a:fontRef idx="minor">
+            <a:schemeClr val="lt1"/>
+          </a:fontRef>
+        </p:style>
+        <p:txBody>
+          <a:bodyPr rtlCol="0" anchor="ctr"/>
+          <a:lstStyle/>
+          <a:p>
+            <a:pPr algn="ctr"/>
+            <a:endParaRPr lang="en-US"/>
+          </a:p>
+        </p:txBody>
+      </p:sp>
+      <p:sp>
+        <p:nvSpPr>
+          <p:cNvPr id="8" name="Title 1">
+            <a:extLst>
+              <a:ext uri="{FF2B5EF4-FFF2-40B4-BE49-F238E27FC236}">
+                <a16:creationId xmlns:a16="http://schemas.microsoft.com/office/drawing/2014/main" id="{780578A0-2D91-03E7-331D-C72C38A11101}"/>
+              </a:ext>
+            </a:extLst>
+          </p:cNvPr>
+          <p:cNvSpPr txBox="1">
+            <a:spLocks/>
+          </p:cNvSpPr>
+          <p:nvPr/>
+        </p:nvSpPr>
+        <p:spPr>
+          <a:xfrm>
+            <a:off x="2115767" y="185861"/>
+            <a:ext cx="7958331" cy="1077229"/>
+          </a:xfrm>
+          <a:prstGeom prst="rect">
+            <a:avLst/>
+          </a:prstGeom>
+        </p:spPr>
+        <p:txBody>
+          <a:bodyPr vert="horz" lIns="91440" tIns="45720" rIns="91440" bIns="45720" rtlCol="0" anchor="t">
+            <a:normAutofit fontScale="92500"/>
+          </a:bodyPr>
+          <a:lstStyle>
+            <a:lvl1pPr algn="r" defTabSz="914400" rtl="0" eaLnBrk="1" latinLnBrk="0" hangingPunct="1">
+              <a:lnSpc>
+                <a:spcPct val="90000"/>
+              </a:lnSpc>
+              <a:spcBef>
+                <a:spcPct val="0"/>
+              </a:spcBef>
+              <a:buNone/>
+              <a:defRPr sz="3400" b="0" i="0" kern="1200" cap="none">
+                <a:solidFill>
+                  <a:schemeClr val="tx1"/>
+                </a:solidFill>
+                <a:effectLst/>
+                <a:latin typeface="+mj-lt"/>
+                <a:ea typeface="+mj-ea"/>
+                <a:cs typeface="+mj-cs"/>
+              </a:defRPr>
+            </a:lvl1pPr>
+          </a:lstStyle>
+          <a:p>
+            <a:pPr algn="l"/>
+            <a:r>
+              <a:rPr lang="en-US" sz="3600" dirty="0"/>
+              <a:t>Three Sample Distributions Confirming Further Rejection of Null Hypothesis</a:t>
+            </a:r>
+            <a:endParaRPr lang="en-US" sz="2000" dirty="0"/>
+          </a:p>
+        </p:txBody>
+      </p:sp>
+    </p:spTree>
+    <p:extLst>
+      <p:ext uri="{BB962C8B-B14F-4D97-AF65-F5344CB8AC3E}">
+        <p14:creationId xmlns:p14="http://schemas.microsoft.com/office/powerpoint/2010/main" val="1707710675"/>
       </p:ext>
     </p:extLst>
   </p:cSld>

</xml_diff>